<commit_message>
enrollment and sort fixed
</commit_message>
<xml_diff>
--- a/Truman/Hyman_ECE Data Strategist Task 090622.pptx
+++ b/Truman/Hyman_ECE Data Strategist Task 090622.pptx
@@ -219,7 +219,7 @@
           <a:p>
             <a:fld id="{29B5985A-C0DD-E149-B4A2-0225C23ECB3F}" type="datetimeFigureOut">
               <a:rPr lang="en-US" smtClean="0"/>
-              <a:t>9/14/22</a:t>
+              <a:t>9/20/22</a:t>
             </a:fld>
             <a:endParaRPr lang="en-US"/>
           </a:p>
@@ -591,7 +591,7 @@
             <a:fld id="{77168361-0BFC-D641-B806-478A5036852C}" type="datetimeFigureOut">
               <a:rPr lang="en-US" smtClean="0"/>
               <a:pPr/>
-              <a:t>9/14/22</a:t>
+              <a:t>9/20/22</a:t>
             </a:fld>
             <a:endParaRPr lang="en-US" dirty="0"/>
           </a:p>
@@ -1752,7 +1752,7 @@
             <a:fld id="{77168361-0BFC-D641-B806-478A5036852C}" type="datetimeFigureOut">
               <a:rPr lang="en-US" smtClean="0"/>
               <a:pPr/>
-              <a:t>9/14/22</a:t>
+              <a:t>9/20/22</a:t>
             </a:fld>
             <a:endParaRPr lang="en-US" dirty="0"/>
           </a:p>
@@ -3118,7 +3118,7 @@
             <a:fld id="{77168361-0BFC-D641-B806-478A5036852C}" type="datetimeFigureOut">
               <a:rPr lang="en-US" smtClean="0"/>
               <a:pPr/>
-              <a:t>9/14/22</a:t>
+              <a:t>9/20/22</a:t>
             </a:fld>
             <a:endParaRPr lang="en-US" dirty="0"/>
           </a:p>
@@ -3495,7 +3495,7 @@
             <a:fld id="{0DB44254-D2B9-854C-A61F-532B10C1B258}" type="datetimeFigureOut">
               <a:rPr lang="en-US" smtClean="0"/>
               <a:pPr/>
-              <a:t>9/14/22</a:t>
+              <a:t>9/20/22</a:t>
             </a:fld>
             <a:endParaRPr lang="en-US"/>
           </a:p>
@@ -5345,7 +5345,7 @@
           <a:p>
             <a:fld id="{DD392DA4-EEA6-4F26-8BE5-2D06904286E3}" type="datetime1">
               <a:rPr lang="en-US" smtClean="0"/>
-              <a:t>9/14/22</a:t>
+              <a:t>9/20/22</a:t>
             </a:fld>
             <a:endParaRPr lang="en-US" dirty="0"/>
           </a:p>
@@ -5595,7 +5595,7 @@
           <a:p>
             <a:fld id="{3914F3FB-FCB7-4F71-947E-EA598C7EA2AB}" type="datetime1">
               <a:rPr lang="en-US" smtClean="0"/>
-              <a:t>9/14/22</a:t>
+              <a:t>9/20/22</a:t>
             </a:fld>
             <a:endParaRPr lang="en-US" dirty="0"/>
           </a:p>
@@ -5891,7 +5891,7 @@
             <a:fld id="{77168361-0BFC-D641-B806-478A5036852C}" type="datetimeFigureOut">
               <a:rPr lang="en-US" smtClean="0"/>
               <a:pPr/>
-              <a:t>9/14/22</a:t>
+              <a:t>9/20/22</a:t>
             </a:fld>
             <a:endParaRPr lang="en-US" dirty="0"/>
           </a:p>
@@ -6212,7 +6212,7 @@
           <a:p>
             <a:fld id="{602C8223-4994-4FD9-A911-03CC554BBC3F}" type="datetime1">
               <a:rPr lang="en-US" smtClean="0"/>
-              <a:t>9/14/22</a:t>
+              <a:t>9/20/22</a:t>
             </a:fld>
             <a:endParaRPr lang="en-US" dirty="0"/>
           </a:p>
@@ -6592,7 +6592,7 @@
           <a:p>
             <a:fld id="{EB3D3CF7-F22A-423A-95A5-B8957656B92B}" type="datetime1">
               <a:rPr lang="en-US" smtClean="0"/>
-              <a:t>9/14/22</a:t>
+              <a:t>9/20/22</a:t>
             </a:fld>
             <a:endParaRPr lang="en-US" dirty="0"/>
           </a:p>
@@ -7305,7 +7305,7 @@
           <a:p>
             <a:fld id="{865BA2D3-8C06-414E-BF90-B26A260236CD}" type="datetime1">
               <a:rPr lang="en-US" smtClean="0"/>
-              <a:t>9/14/22</a:t>
+              <a:t>9/20/22</a:t>
             </a:fld>
             <a:endParaRPr lang="en-US" dirty="0"/>
           </a:p>
@@ -8052,7 +8052,7 @@
           <a:p>
             <a:fld id="{A158C884-0517-4820-86D9-E12EF974B104}" type="datetime1">
               <a:rPr lang="en-US" smtClean="0"/>
-              <a:t>9/14/22</a:t>
+              <a:t>9/20/22</a:t>
             </a:fld>
             <a:endParaRPr lang="en-US" dirty="0"/>
           </a:p>
@@ -8375,7 +8375,7 @@
           <a:p>
             <a:fld id="{36D1F559-7B75-4F7D-97F1-9B0C6A71DD02}" type="datetime1">
               <a:rPr lang="en-US" smtClean="0"/>
-              <a:t>9/14/22</a:t>
+              <a:t>9/20/22</a:t>
             </a:fld>
             <a:endParaRPr lang="en-US" dirty="0"/>
           </a:p>
@@ -8916,7 +8916,7 @@
           <a:p>
             <a:fld id="{D1C17783-23EF-4F7D-8D13-D56B0EC52025}" type="datetime1">
               <a:rPr lang="en-US" smtClean="0"/>
-              <a:t>9/14/22</a:t>
+              <a:t>9/20/22</a:t>
             </a:fld>
             <a:endParaRPr lang="en-US" dirty="0"/>
           </a:p>
@@ -9761,7 +9761,7 @@
           <a:p>
             <a:fld id="{46C12D50-A656-49E6-BBC7-04D90DD3C132}" type="datetime1">
               <a:rPr lang="en-US" smtClean="0"/>
-              <a:t>9/14/22</a:t>
+              <a:t>9/20/22</a:t>
             </a:fld>
             <a:endParaRPr lang="en-US" dirty="0"/>
           </a:p>
@@ -10599,7 +10599,7 @@
           <a:p>
             <a:fld id="{A061ADA0-481D-484D-9DF8-E1E4F4704C66}" type="datetime1">
               <a:rPr lang="en-US" smtClean="0"/>
-              <a:t>9/14/22</a:t>
+              <a:t>9/20/22</a:t>
             </a:fld>
             <a:endParaRPr lang="en-US" dirty="0"/>
           </a:p>
@@ -10932,7 +10932,7 @@
           <a:p>
             <a:fld id="{10EFCE2F-DBCB-4F65-B9DD-D8FF84E7E171}" type="datetime1">
               <a:rPr lang="en-US" smtClean="0"/>
-              <a:t>9/14/22</a:t>
+              <a:t>9/20/22</a:t>
             </a:fld>
             <a:endParaRPr lang="en-US" dirty="0"/>
           </a:p>
@@ -11191,7 +11191,7 @@
                 </a:solidFill>
                 <a:cs typeface="Arial" charset="0"/>
               </a:rPr>
-              <a:t>9/14/22 1:20 PM</a:t>
+              <a:t>9/20/22 9:36 AM</a:t>
             </a:fld>
             <a:endParaRPr lang="en-US" sz="900" dirty="0">
               <a:solidFill>
@@ -11601,7 +11601,7 @@
           <a:p>
             <a:fld id="{974C64AA-CBE5-43AE-8207-B6646974CE37}" type="datetime1">
               <a:rPr lang="en-US" smtClean="0"/>
-              <a:t>9/14/22</a:t>
+              <a:t>9/20/22</a:t>
             </a:fld>
             <a:endParaRPr lang="en-US" dirty="0"/>
           </a:p>
@@ -11766,7 +11766,7 @@
             <a:fld id="{77168361-0BFC-D641-B806-478A5036852C}" type="datetimeFigureOut">
               <a:rPr lang="en-US" smtClean="0"/>
               <a:pPr/>
-              <a:t>9/14/22</a:t>
+              <a:t>9/20/22</a:t>
             </a:fld>
             <a:endParaRPr lang="en-US" dirty="0"/>
           </a:p>
@@ -12036,7 +12036,7 @@
             <a:fld id="{77168361-0BFC-D641-B806-478A5036852C}" type="datetimeFigureOut">
               <a:rPr lang="en-US" smtClean="0"/>
               <a:pPr/>
-              <a:t>9/14/22</a:t>
+              <a:t>9/20/22</a:t>
             </a:fld>
             <a:endParaRPr lang="en-US" dirty="0"/>
           </a:p>
@@ -12235,7 +12235,7 @@
             <a:fld id="{77168361-0BFC-D641-B806-478A5036852C}" type="datetimeFigureOut">
               <a:rPr lang="en-US" smtClean="0"/>
               <a:pPr/>
-              <a:t>9/14/22</a:t>
+              <a:t>9/20/22</a:t>
             </a:fld>
             <a:endParaRPr lang="en-US" dirty="0"/>
           </a:p>
@@ -12434,7 +12434,7 @@
             <a:fld id="{77168361-0BFC-D641-B806-478A5036852C}" type="datetimeFigureOut">
               <a:rPr lang="en-US" smtClean="0"/>
               <a:pPr/>
-              <a:t>9/14/22</a:t>
+              <a:t>9/20/22</a:t>
             </a:fld>
             <a:endParaRPr lang="en-US" dirty="0"/>
           </a:p>
@@ -12625,7 +12625,7 @@
             <a:fld id="{77168361-0BFC-D641-B806-478A5036852C}" type="datetimeFigureOut">
               <a:rPr lang="en-US" smtClean="0"/>
               <a:pPr/>
-              <a:t>9/14/22</a:t>
+              <a:t>9/20/22</a:t>
             </a:fld>
             <a:endParaRPr lang="en-US" dirty="0"/>
           </a:p>
@@ -12858,7 +12858,7 @@
             <a:fld id="{77168361-0BFC-D641-B806-478A5036852C}" type="datetimeFigureOut">
               <a:rPr lang="en-US" smtClean="0"/>
               <a:pPr/>
-              <a:t>9/14/22</a:t>
+              <a:t>9/20/22</a:t>
             </a:fld>
             <a:endParaRPr lang="en-US" dirty="0"/>
           </a:p>
@@ -13128,7 +13128,7 @@
             <a:fld id="{77168361-0BFC-D641-B806-478A5036852C}" type="datetimeFigureOut">
               <a:rPr lang="en-US" smtClean="0"/>
               <a:pPr/>
-              <a:t>9/14/22</a:t>
+              <a:t>9/20/22</a:t>
             </a:fld>
             <a:endParaRPr lang="en-US" dirty="0"/>
           </a:p>
@@ -13332,7 +13332,7 @@
             <a:fld id="{77168361-0BFC-D641-B806-478A5036852C}" type="datetimeFigureOut">
               <a:rPr lang="en-US" smtClean="0"/>
               <a:pPr/>
-              <a:t>9/14/22</a:t>
+              <a:t>9/20/22</a:t>
             </a:fld>
             <a:endParaRPr lang="en-US" dirty="0"/>
           </a:p>
@@ -13494,7 +13494,7 @@
             <a:fld id="{77168361-0BFC-D641-B806-478A5036852C}" type="datetimeFigureOut">
               <a:rPr lang="en-US" smtClean="0"/>
               <a:pPr/>
-              <a:t>9/14/22</a:t>
+              <a:t>9/20/22</a:t>
             </a:fld>
             <a:endParaRPr lang="en-US" dirty="0"/>
           </a:p>
@@ -13764,7 +13764,7 @@
             <a:fld id="{77168361-0BFC-D641-B806-478A5036852C}" type="datetimeFigureOut">
               <a:rPr lang="en-US" smtClean="0"/>
               <a:pPr/>
-              <a:t>9/14/22</a:t>
+              <a:t>9/20/22</a:t>
             </a:fld>
             <a:endParaRPr lang="en-US" dirty="0"/>
           </a:p>
@@ -13968,7 +13968,7 @@
             <a:fld id="{77168361-0BFC-D641-B806-478A5036852C}" type="datetimeFigureOut">
               <a:rPr lang="en-US" smtClean="0"/>
               <a:pPr/>
-              <a:t>9/14/22</a:t>
+              <a:t>9/20/22</a:t>
             </a:fld>
             <a:endParaRPr lang="en-US" dirty="0"/>
           </a:p>
@@ -14787,7 +14787,7 @@
             <a:fld id="{77168361-0BFC-D641-B806-478A5036852C}" type="datetimeFigureOut">
               <a:rPr lang="en-US" smtClean="0"/>
               <a:pPr/>
-              <a:t>9/14/22</a:t>
+              <a:t>9/20/22</a:t>
             </a:fld>
             <a:endParaRPr lang="en-US"/>
           </a:p>
@@ -15321,7 +15321,7 @@
           <a:p>
             <a:fld id="{DCE503BE-CA30-9241-9758-B9656162B3B5}" type="datetimeFigureOut">
               <a:rPr lang="en-US" smtClean="0"/>
-              <a:t>9/14/22</a:t>
+              <a:t>9/20/22</a:t>
             </a:fld>
             <a:endParaRPr lang="en-US"/>
           </a:p>
@@ -15945,7 +15945,7 @@
           <a:p>
             <a:fld id="{0DB44254-D2B9-854C-A61F-532B10C1B258}" type="datetimeFigureOut">
               <a:rPr lang="en-US" smtClean="0"/>
-              <a:t>9/14/22</a:t>
+              <a:t>9/20/22</a:t>
             </a:fld>
             <a:endParaRPr lang="en-US"/>
           </a:p>
@@ -16569,7 +16569,7 @@
           <a:p>
             <a:fld id="{8904D19C-18E8-C843-8EA9-8532FDF99A84}" type="datetimeFigureOut">
               <a:rPr lang="en-US" smtClean="0"/>
-              <a:t>9/14/22</a:t>
+              <a:t>9/20/22</a:t>
             </a:fld>
             <a:endParaRPr lang="en-US"/>
           </a:p>
@@ -17288,7 +17288,7 @@
           <a:p>
             <a:fld id="{DD392DA4-EEA6-4F26-8BE5-2D06904286E3}" type="datetime1">
               <a:rPr lang="en-US" smtClean="0"/>
-              <a:t>9/14/22</a:t>
+              <a:t>9/20/22</a:t>
             </a:fld>
             <a:endParaRPr lang="en-US" dirty="0"/>
           </a:p>
@@ -18019,7 +18019,7 @@
             <a:fld id="{77168361-0BFC-D641-B806-478A5036852C}" type="datetimeFigureOut">
               <a:rPr lang="en-US" smtClean="0"/>
               <a:pPr/>
-              <a:t>9/14/22</a:t>
+              <a:t>9/20/22</a:t>
             </a:fld>
             <a:endParaRPr lang="en-US"/>
           </a:p>
@@ -18770,7 +18770,7 @@
                   <a:spcPct val="0"/>
                 </a:spcAft>
               </a:pPr>
-              <a:t>9/14/22</a:t>
+              <a:t>9/20/22</a:t>
             </a:fld>
             <a:endParaRPr lang="en-US" dirty="0">
               <a:solidFill>
@@ -18981,24 +18981,24 @@
           <a:lstStyle/>
           <a:p>
             <a:r>
-              <a:rPr lang="en-US" sz="8000" dirty="0"/>
+              <a:rPr lang="en-US" sz="9600" dirty="0"/>
               <a:t>To determine length of time to complete each academic program, initial semester and year is needed.</a:t>
             </a:r>
           </a:p>
           <a:p>
-            <a:endParaRPr lang="en-US" sz="8000" dirty="0"/>
-          </a:p>
-          <a:p>
-            <a:r>
-              <a:rPr lang="en-US" sz="8000" dirty="0"/>
+            <a:endParaRPr lang="en-US" sz="9600" dirty="0"/>
+          </a:p>
+          <a:p>
+            <a:r>
+              <a:rPr lang="en-US" sz="9600" dirty="0"/>
               <a:t>It would be useful to know if students transferred into an ECE program.</a:t>
             </a:r>
           </a:p>
           <a:p>
-            <a:endParaRPr lang="en-US" sz="8000" dirty="0"/>
-          </a:p>
-          <a:p>
-            <a:endParaRPr lang="en-US" sz="6400" dirty="0"/>
+            <a:endParaRPr lang="en-US" sz="9600" dirty="0"/>
+          </a:p>
+          <a:p>
+            <a:endParaRPr lang="en-US" sz="9600" dirty="0"/>
           </a:p>
           <a:p>
             <a:endParaRPr lang="en-US" dirty="0"/>
@@ -19134,6 +19134,15 @@
             </a:r>
           </a:p>
           <a:p>
+            <a:r>
+              <a:rPr lang="en-US" dirty="0"/>
+              <a:t>Impact of coaches on enrollment, drops, and graduations could be deduced when coach data is available.</a:t>
+            </a:r>
+          </a:p>
+          <a:p>
+            <a:endParaRPr lang="en-US" dirty="0"/>
+          </a:p>
+          <a:p>
             <a:endParaRPr lang="en-US" dirty="0"/>
           </a:p>
           <a:p>
@@ -19195,7 +19204,10 @@
           <a:bodyPr/>
           <a:lstStyle/>
           <a:p>
-            <a:endParaRPr lang="en-US"/>
+            <a:r>
+              <a:rPr lang="en-US" dirty="0"/>
+              <a:t>Thank You</a:t>
+            </a:r>
           </a:p>
         </p:txBody>
       </p:sp>
@@ -19220,7 +19232,7 @@
           <a:bodyPr/>
           <a:lstStyle/>
           <a:p>
-            <a:endParaRPr lang="en-US"/>
+            <a:endParaRPr lang="en-US" dirty="0"/>
           </a:p>
         </p:txBody>
       </p:sp>
@@ -19608,7 +19620,7 @@
                   <a:spcPct val="0"/>
                 </a:spcAft>
               </a:pPr>
-              <a:t>9/14/22</a:t>
+              <a:t>9/20/22</a:t>
             </a:fld>
             <a:endParaRPr lang="en-US" dirty="0">
               <a:solidFill>
@@ -20229,7 +20241,7 @@
                   <a:spcPct val="0"/>
                 </a:spcAft>
               </a:pPr>
-              <a:t>9/14/22</a:t>
+              <a:t>9/20/22</a:t>
             </a:fld>
             <a:endParaRPr lang="en-US" dirty="0">
               <a:solidFill>
@@ -20367,7 +20379,7 @@
           <a:p>
             <a:r>
               <a:rPr lang="en-US" dirty="0"/>
-              <a:t>ECE 2019-2022 </a:t>
+              <a:t>ECE Data 2019-2022 </a:t>
             </a:r>
           </a:p>
         </p:txBody>
@@ -22180,17 +22192,17 @@
           <a:p>
             <a:r>
               <a:rPr lang="en-US" sz="3200" dirty="0"/>
-              <a:t>Enrollment is more than 10 times higher in Fall 2022 than Fall 2019. </a:t>
+              <a:t>Fall 2022 enrollment up 30% from Fall 2021. </a:t>
             </a:r>
           </a:p>
         </p:txBody>
       </p:sp>
       <p:pic>
         <p:nvPicPr>
-          <p:cNvPr id="5" name="Picture 4" descr="Chart&#10;&#10;Description automatically generated">
+          <p:cNvPr id="6" name="Picture 5" descr="Chart, bar chart&#10;&#10;Description automatically generated">
             <a:extLst>
               <a:ext uri="{FF2B5EF4-FFF2-40B4-BE49-F238E27FC236}">
-                <a16:creationId xmlns:a16="http://schemas.microsoft.com/office/drawing/2014/main" id="{61E3B355-3D86-C59A-9724-C97EDAF20037}"/>
+                <a16:creationId xmlns:a16="http://schemas.microsoft.com/office/drawing/2014/main" id="{2D6F6DA3-7F10-D9EC-7136-E783178BD14D}"/>
               </a:ext>
             </a:extLst>
           </p:cNvPr>
@@ -22207,8 +22219,8 @@
         </p:blipFill>
         <p:spPr>
           <a:xfrm>
-            <a:off x="202839" y="925759"/>
-            <a:ext cx="7535849" cy="5665506"/>
+            <a:off x="339337" y="1079323"/>
+            <a:ext cx="6913611" cy="5566804"/>
           </a:xfrm>
           <a:prstGeom prst="rect">
             <a:avLst/>
@@ -22217,10 +22229,10 @@
       </p:pic>
       <p:pic>
         <p:nvPicPr>
-          <p:cNvPr id="7" name="Picture 6" descr="Table&#10;&#10;Description automatically generated">
+          <p:cNvPr id="9" name="Picture 8" descr="Table&#10;&#10;Description automatically generated">
             <a:extLst>
               <a:ext uri="{FF2B5EF4-FFF2-40B4-BE49-F238E27FC236}">
-                <a16:creationId xmlns:a16="http://schemas.microsoft.com/office/drawing/2014/main" id="{69AD6671-C21E-B5C4-BFD8-55C223427860}"/>
+                <a16:creationId xmlns:a16="http://schemas.microsoft.com/office/drawing/2014/main" id="{960F17DA-A7FD-99EC-7F83-B4158C063F5A}"/>
               </a:ext>
             </a:extLst>
           </p:cNvPr>
@@ -22237,8 +22249,8 @@
         </p:blipFill>
         <p:spPr>
           <a:xfrm>
-            <a:off x="7937861" y="1098473"/>
-            <a:ext cx="4142606" cy="1455156"/>
+            <a:off x="7270254" y="1257743"/>
+            <a:ext cx="4921318" cy="1619272"/>
           </a:xfrm>
           <a:prstGeom prst="rect">
             <a:avLst/>
@@ -22329,7 +22341,7 @@
         </p:nvSpPr>
         <p:spPr>
           <a:xfrm>
-            <a:off x="6905334" y="3428999"/>
+            <a:off x="6860729" y="3714822"/>
             <a:ext cx="4075855" cy="2904893"/>
           </a:xfrm>
         </p:spPr>
@@ -22339,7 +22351,7 @@
           <a:p>
             <a:r>
               <a:rPr lang="en-US" dirty="0"/>
-              <a:t>Graduations are steady from 2019 to 2021. Average of 74 in Spring and 55 in Fall.</a:t>
+              <a:t>Graduations have fallen. 2021 -2022 graduations are 58% of 2019-2020 graduations. </a:t>
             </a:r>
           </a:p>
           <a:p>
@@ -22352,10 +22364,10 @@
       </p:sp>
       <p:pic>
         <p:nvPicPr>
-          <p:cNvPr id="5" name="Picture 4" descr="Chart, bar chart&#10;&#10;Description automatically generated">
+          <p:cNvPr id="6" name="Picture 5" descr="Chart, bar chart&#10;&#10;Description automatically generated">
             <a:extLst>
               <a:ext uri="{FF2B5EF4-FFF2-40B4-BE49-F238E27FC236}">
-                <a16:creationId xmlns:a16="http://schemas.microsoft.com/office/drawing/2014/main" id="{D3E52D18-0C1D-3225-2A9D-62ABA8456698}"/>
+                <a16:creationId xmlns:a16="http://schemas.microsoft.com/office/drawing/2014/main" id="{36EA98C1-E509-34C4-ECCF-0FFB924972B7}"/>
               </a:ext>
             </a:extLst>
           </p:cNvPr>
@@ -22372,8 +22384,8 @@
         </p:blipFill>
         <p:spPr>
           <a:xfrm>
-            <a:off x="331128" y="1062197"/>
-            <a:ext cx="6259093" cy="5271696"/>
+            <a:off x="0" y="1062197"/>
+            <a:ext cx="6146020" cy="4825647"/>
           </a:xfrm>
           <a:prstGeom prst="rect">
             <a:avLst/>
@@ -22382,10 +22394,10 @@
       </p:pic>
       <p:pic>
         <p:nvPicPr>
-          <p:cNvPr id="7" name="Picture 6" descr="Table&#10;&#10;Description automatically generated">
+          <p:cNvPr id="9" name="Picture 8" descr="Table&#10;&#10;Description automatically generated with low confidence">
             <a:extLst>
               <a:ext uri="{FF2B5EF4-FFF2-40B4-BE49-F238E27FC236}">
-                <a16:creationId xmlns:a16="http://schemas.microsoft.com/office/drawing/2014/main" id="{2981024E-26F6-1616-0D97-D39840DC0422}"/>
+                <a16:creationId xmlns:a16="http://schemas.microsoft.com/office/drawing/2014/main" id="{91CE2E21-E817-6EB5-90D5-89653ACC0ACD}"/>
               </a:ext>
             </a:extLst>
           </p:cNvPr>
@@ -22402,8 +22414,8 @@
         </p:blipFill>
         <p:spPr>
           <a:xfrm>
-            <a:off x="6776537" y="1172792"/>
-            <a:ext cx="4333450" cy="1994154"/>
+            <a:off x="6146020" y="1062197"/>
+            <a:ext cx="5904750" cy="2488431"/>
           </a:xfrm>
           <a:prstGeom prst="rect">
             <a:avLst/>
@@ -22492,7 +22504,7 @@
         </p:nvSpPr>
         <p:spPr>
           <a:xfrm>
-            <a:off x="7651723" y="3444778"/>
+            <a:off x="6748474" y="3678954"/>
             <a:ext cx="4168570" cy="3078685"/>
           </a:xfrm>
         </p:spPr>
@@ -22502,11 +22514,8 @@
           <a:p>
             <a:r>
               <a:rPr lang="en-US" dirty="0"/>
-              <a:t>Drop rate has not increased with enrollment from 2019-2021. </a:t>
-            </a:r>
-          </a:p>
-          <a:p>
-            <a:endParaRPr lang="en-US" dirty="0"/>
+              <a:t>Drops for 2021-=2022 are 49% of drops for 2019-2020. </a:t>
+            </a:r>
           </a:p>
           <a:p>
             <a:r>
@@ -22521,10 +22530,10 @@
       </p:sp>
       <p:pic>
         <p:nvPicPr>
-          <p:cNvPr id="5" name="Picture 4" descr="Chart, bar chart&#10;&#10;Description automatically generated">
+          <p:cNvPr id="6" name="Picture 5" descr="Chart, bar chart&#10;&#10;Description automatically generated">
             <a:extLst>
               <a:ext uri="{FF2B5EF4-FFF2-40B4-BE49-F238E27FC236}">
-                <a16:creationId xmlns:a16="http://schemas.microsoft.com/office/drawing/2014/main" id="{95FD4931-CFDA-5D79-FDE9-2C230E35D326}"/>
+                <a16:creationId xmlns:a16="http://schemas.microsoft.com/office/drawing/2014/main" id="{076C4581-2BFA-42EF-9157-74F1FD9286B6}"/>
               </a:ext>
             </a:extLst>
           </p:cNvPr>
@@ -22541,8 +22550,8 @@
         </p:blipFill>
         <p:spPr>
           <a:xfrm>
-            <a:off x="260328" y="987092"/>
-            <a:ext cx="6984556" cy="5701305"/>
+            <a:off x="181827" y="1146716"/>
+            <a:ext cx="5987192" cy="4741127"/>
           </a:xfrm>
           <a:prstGeom prst="rect">
             <a:avLst/>
@@ -22551,10 +22560,10 @@
       </p:pic>
       <p:pic>
         <p:nvPicPr>
-          <p:cNvPr id="7" name="Picture 6" descr="Table&#10;&#10;Description automatically generated with medium confidence">
+          <p:cNvPr id="9" name="Picture 8" descr="Table&#10;&#10;Description automatically generated with medium confidence">
             <a:extLst>
               <a:ext uri="{FF2B5EF4-FFF2-40B4-BE49-F238E27FC236}">
-                <a16:creationId xmlns:a16="http://schemas.microsoft.com/office/drawing/2014/main" id="{59415D65-96BA-80F2-F019-9F15A3CE180E}"/>
+                <a16:creationId xmlns:a16="http://schemas.microsoft.com/office/drawing/2014/main" id="{04C2C6E9-DE65-2466-EFD6-C4AEAB959E27}"/>
               </a:ext>
             </a:extLst>
           </p:cNvPr>
@@ -22571,8 +22580,8 @@
         </p:blipFill>
         <p:spPr>
           <a:xfrm>
-            <a:off x="7244884" y="980656"/>
-            <a:ext cx="4879581" cy="2163988"/>
+            <a:off x="6178084" y="1146716"/>
+            <a:ext cx="5642209" cy="2336885"/>
           </a:xfrm>
           <a:prstGeom prst="rect">
             <a:avLst/>

</xml_diff>